<commit_message>
Update DG and test cases
</commit_message>
<xml_diff>
--- a/docs/diagrams/FindSequenceDiagram.pptx
+++ b/docs/diagrams/FindSequenceDiagram.pptx
@@ -208,7 +208,7 @@
           <a:p>
             <a:fld id="{F5CC4B3F-88C1-4FFA-B1B6-F41C21DC6924}" type="datetimeFigureOut">
               <a:rPr lang="en-US" smtClean="0"/>
-              <a:t>11/6/2018</a:t>
+              <a:t>11/10/2018</a:t>
             </a:fld>
             <a:endParaRPr lang="en-US"/>
           </a:p>
@@ -654,7 +654,7 @@
           <a:p>
             <a:fld id="{78C97017-6FC3-485B-9764-EAC9E56C1D49}" type="datetimeFigureOut">
               <a:rPr lang="en-US" smtClean="0"/>
-              <a:t>11/6/2018</a:t>
+              <a:t>11/10/2018</a:t>
             </a:fld>
             <a:endParaRPr lang="en-US"/>
           </a:p>
@@ -822,7 +822,7 @@
           <a:p>
             <a:fld id="{78C97017-6FC3-485B-9764-EAC9E56C1D49}" type="datetimeFigureOut">
               <a:rPr lang="en-US" smtClean="0"/>
-              <a:t>11/6/2018</a:t>
+              <a:t>11/10/2018</a:t>
             </a:fld>
             <a:endParaRPr lang="en-US"/>
           </a:p>
@@ -1000,7 +1000,7 @@
           <a:p>
             <a:fld id="{78C97017-6FC3-485B-9764-EAC9E56C1D49}" type="datetimeFigureOut">
               <a:rPr lang="en-US" smtClean="0"/>
-              <a:t>11/6/2018</a:t>
+              <a:t>11/10/2018</a:t>
             </a:fld>
             <a:endParaRPr lang="en-US"/>
           </a:p>
@@ -1168,7 +1168,7 @@
           <a:p>
             <a:fld id="{78C97017-6FC3-485B-9764-EAC9E56C1D49}" type="datetimeFigureOut">
               <a:rPr lang="en-US" smtClean="0"/>
-              <a:t>11/6/2018</a:t>
+              <a:t>11/10/2018</a:t>
             </a:fld>
             <a:endParaRPr lang="en-US"/>
           </a:p>
@@ -1413,7 +1413,7 @@
           <a:p>
             <a:fld id="{78C97017-6FC3-485B-9764-EAC9E56C1D49}" type="datetimeFigureOut">
               <a:rPr lang="en-US" smtClean="0"/>
-              <a:t>11/6/2018</a:t>
+              <a:t>11/10/2018</a:t>
             </a:fld>
             <a:endParaRPr lang="en-US"/>
           </a:p>
@@ -1698,7 +1698,7 @@
           <a:p>
             <a:fld id="{78C97017-6FC3-485B-9764-EAC9E56C1D49}" type="datetimeFigureOut">
               <a:rPr lang="en-US" smtClean="0"/>
-              <a:t>11/6/2018</a:t>
+              <a:t>11/10/2018</a:t>
             </a:fld>
             <a:endParaRPr lang="en-US"/>
           </a:p>
@@ -2117,7 +2117,7 @@
           <a:p>
             <a:fld id="{78C97017-6FC3-485B-9764-EAC9E56C1D49}" type="datetimeFigureOut">
               <a:rPr lang="en-US" smtClean="0"/>
-              <a:t>11/6/2018</a:t>
+              <a:t>11/10/2018</a:t>
             </a:fld>
             <a:endParaRPr lang="en-US"/>
           </a:p>
@@ -2234,7 +2234,7 @@
           <a:p>
             <a:fld id="{78C97017-6FC3-485B-9764-EAC9E56C1D49}" type="datetimeFigureOut">
               <a:rPr lang="en-US" smtClean="0"/>
-              <a:t>11/6/2018</a:t>
+              <a:t>11/10/2018</a:t>
             </a:fld>
             <a:endParaRPr lang="en-US"/>
           </a:p>
@@ -2329,7 +2329,7 @@
           <a:p>
             <a:fld id="{78C97017-6FC3-485B-9764-EAC9E56C1D49}" type="datetimeFigureOut">
               <a:rPr lang="en-US" smtClean="0"/>
-              <a:t>11/6/2018</a:t>
+              <a:t>11/10/2018</a:t>
             </a:fld>
             <a:endParaRPr lang="en-US"/>
           </a:p>
@@ -2604,7 +2604,7 @@
           <a:p>
             <a:fld id="{78C97017-6FC3-485B-9764-EAC9E56C1D49}" type="datetimeFigureOut">
               <a:rPr lang="en-US" smtClean="0"/>
-              <a:t>11/6/2018</a:t>
+              <a:t>11/10/2018</a:t>
             </a:fld>
             <a:endParaRPr lang="en-US"/>
           </a:p>
@@ -2856,7 +2856,7 @@
           <a:p>
             <a:fld id="{78C97017-6FC3-485B-9764-EAC9E56C1D49}" type="datetimeFigureOut">
               <a:rPr lang="en-US" smtClean="0"/>
-              <a:t>11/6/2018</a:t>
+              <a:t>11/10/2018</a:t>
             </a:fld>
             <a:endParaRPr lang="en-US"/>
           </a:p>
@@ -3067,7 +3067,7 @@
           <a:p>
             <a:fld id="{78C97017-6FC3-485B-9764-EAC9E56C1D49}" type="datetimeFigureOut">
               <a:rPr lang="en-US" smtClean="0"/>
-              <a:t>11/6/2018</a:t>
+              <a:t>11/10/2018</a:t>
             </a:fld>
             <a:endParaRPr lang="en-US"/>
           </a:p>
@@ -3457,7 +3457,7 @@
         <p:spPr>
           <a:xfrm>
             <a:off x="7922112" y="2816284"/>
-            <a:ext cx="942462" cy="3051116"/>
+            <a:ext cx="1188990" cy="3051116"/>
           </a:xfrm>
           <a:prstGeom prst="roundRect">
             <a:avLst>
@@ -3575,13 +3575,14 @@
           <p:cNvPr id="17" name="Straight Connector 16"/>
           <p:cNvCxnSpPr>
             <a:cxnSpLocks/>
+            <a:stCxn id="16" idx="2"/>
           </p:cNvCxnSpPr>
           <p:nvPr/>
         </p:nvCxnSpPr>
         <p:spPr>
           <a:xfrm>
-            <a:off x="4768023" y="3172926"/>
-            <a:ext cx="7144" cy="1193583"/>
+            <a:off x="4761172" y="3319717"/>
+            <a:ext cx="0" cy="1072174"/>
           </a:xfrm>
           <a:prstGeom prst="line">
             <a:avLst/>
@@ -3762,7 +3763,7 @@
         </p:nvSpPr>
         <p:spPr>
           <a:xfrm>
-            <a:off x="4418941" y="2951443"/>
+            <a:off x="4376954" y="2954806"/>
             <a:ext cx="768435" cy="364911"/>
           </a:xfrm>
           <a:prstGeom prst="rect">
@@ -3832,8 +3833,8 @@
         </p:nvSpPr>
         <p:spPr>
           <a:xfrm>
-            <a:off x="4725653" y="3505202"/>
-            <a:ext cx="102102" cy="741218"/>
+            <a:off x="4725652" y="3581400"/>
+            <a:ext cx="106613" cy="665020"/>
           </a:xfrm>
           <a:prstGeom prst="rect">
             <a:avLst/>
@@ -4045,9 +4046,9 @@
           <p:nvPr/>
         </p:nvCxnSpPr>
         <p:spPr>
-          <a:xfrm>
-            <a:off x="2346338" y="3206327"/>
-            <a:ext cx="762176" cy="0"/>
+          <a:xfrm flipV="1">
+            <a:off x="2365642" y="3504239"/>
+            <a:ext cx="1128893" cy="17184"/>
           </a:xfrm>
           <a:prstGeom prst="straightConnector1">
             <a:avLst/>
@@ -4084,7 +4085,7 @@
         </p:nvCxnSpPr>
         <p:spPr>
           <a:xfrm>
-            <a:off x="3610763" y="3521423"/>
+            <a:off x="3599211" y="3581400"/>
             <a:ext cx="1123963" cy="0"/>
           </a:xfrm>
           <a:prstGeom prst="straightConnector1">
@@ -4120,7 +4121,7 @@
         </p:nvSpPr>
         <p:spPr>
           <a:xfrm>
-            <a:off x="1959780" y="3069532"/>
+            <a:off x="2345801" y="3367444"/>
             <a:ext cx="1040072" cy="123111"/>
           </a:xfrm>
           <a:prstGeom prst="rect">
@@ -4352,7 +4353,7 @@
         </p:nvSpPr>
         <p:spPr>
           <a:xfrm>
-            <a:off x="8082761" y="3063923"/>
+            <a:off x="8204185" y="3127390"/>
             <a:ext cx="649504" cy="270560"/>
           </a:xfrm>
           <a:prstGeom prst="rect">
@@ -4504,14 +4505,15 @@
           <p:cNvPr id="71" name="Straight Connector 70"/>
           <p:cNvCxnSpPr>
             <a:cxnSpLocks/>
+            <a:stCxn id="39" idx="2"/>
             <a:endCxn id="159" idx="2"/>
           </p:cNvCxnSpPr>
           <p:nvPr/>
         </p:nvCxnSpPr>
         <p:spPr>
           <a:xfrm flipH="1">
-            <a:off x="8393343" y="3334483"/>
-            <a:ext cx="14170" cy="2532917"/>
+            <a:off x="8516607" y="3397950"/>
+            <a:ext cx="12330" cy="2469450"/>
           </a:xfrm>
           <a:prstGeom prst="line">
             <a:avLst/>
@@ -4547,7 +4549,7 @@
         </p:nvSpPr>
         <p:spPr>
           <a:xfrm>
-            <a:off x="8356100" y="4571999"/>
+            <a:off x="8455728" y="4553368"/>
             <a:ext cx="124217" cy="162984"/>
           </a:xfrm>
           <a:prstGeom prst="rect">
@@ -4595,13 +4597,14 @@
           <p:cNvPr id="75" name="Straight Arrow Connector 74"/>
           <p:cNvCxnSpPr>
             <a:cxnSpLocks/>
+            <a:endCxn id="73" idx="0"/>
           </p:cNvCxnSpPr>
           <p:nvPr/>
         </p:nvCxnSpPr>
         <p:spPr>
           <a:xfrm>
-            <a:off x="6972242" y="4572000"/>
-            <a:ext cx="1424067" cy="0"/>
+            <a:off x="7018654" y="4548998"/>
+            <a:ext cx="1499183" cy="4370"/>
           </a:xfrm>
           <a:prstGeom prst="straightConnector1">
             <a:avLst/>
@@ -4639,7 +4642,7 @@
         <p:spPr>
           <a:xfrm>
             <a:off x="6989113" y="4715593"/>
-            <a:ext cx="1418400" cy="0"/>
+            <a:ext cx="1466615" cy="759"/>
           </a:xfrm>
           <a:prstGeom prst="straightConnector1">
             <a:avLst/>
@@ -4800,7 +4803,7 @@
         </p:nvSpPr>
         <p:spPr>
           <a:xfrm>
-            <a:off x="3674335" y="3376013"/>
+            <a:off x="3667948" y="3408497"/>
             <a:ext cx="971370" cy="123111"/>
           </a:xfrm>
           <a:prstGeom prst="rect">
@@ -5448,7 +5451,7 @@
         </p:nvCxnSpPr>
         <p:spPr>
           <a:xfrm>
-            <a:off x="4845725" y="3581400"/>
+            <a:off x="4840748" y="3657600"/>
             <a:ext cx="557794" cy="0"/>
           </a:xfrm>
           <a:prstGeom prst="straightConnector1">

</xml_diff>

<commit_message>
update ugdg and ppp
</commit_message>
<xml_diff>
--- a/docs/diagrams/FindSequenceDiagram.pptx
+++ b/docs/diagrams/FindSequenceDiagram.pptx
@@ -208,7 +208,7 @@
           <a:p>
             <a:fld id="{F5CC4B3F-88C1-4FFA-B1B6-F41C21DC6924}" type="datetimeFigureOut">
               <a:rPr lang="en-US" smtClean="0"/>
-              <a:t>11/10/18</a:t>
+              <a:t>11/12/18</a:t>
             </a:fld>
             <a:endParaRPr lang="en-US"/>
           </a:p>
@@ -743,7 +743,7 @@
           <a:p>
             <a:fld id="{78C97017-6FC3-485B-9764-EAC9E56C1D49}" type="datetimeFigureOut">
               <a:rPr lang="en-US" smtClean="0"/>
-              <a:t>11/10/18</a:t>
+              <a:t>11/12/18</a:t>
             </a:fld>
             <a:endParaRPr lang="en-US"/>
           </a:p>
@@ -911,7 +911,7 @@
           <a:p>
             <a:fld id="{78C97017-6FC3-485B-9764-EAC9E56C1D49}" type="datetimeFigureOut">
               <a:rPr lang="en-US" smtClean="0"/>
-              <a:t>11/10/18</a:t>
+              <a:t>11/12/18</a:t>
             </a:fld>
             <a:endParaRPr lang="en-US"/>
           </a:p>
@@ -1089,7 +1089,7 @@
           <a:p>
             <a:fld id="{78C97017-6FC3-485B-9764-EAC9E56C1D49}" type="datetimeFigureOut">
               <a:rPr lang="en-US" smtClean="0"/>
-              <a:t>11/10/18</a:t>
+              <a:t>11/12/18</a:t>
             </a:fld>
             <a:endParaRPr lang="en-US"/>
           </a:p>
@@ -1257,7 +1257,7 @@
           <a:p>
             <a:fld id="{78C97017-6FC3-485B-9764-EAC9E56C1D49}" type="datetimeFigureOut">
               <a:rPr lang="en-US" smtClean="0"/>
-              <a:t>11/10/18</a:t>
+              <a:t>11/12/18</a:t>
             </a:fld>
             <a:endParaRPr lang="en-US"/>
           </a:p>
@@ -1502,7 +1502,7 @@
           <a:p>
             <a:fld id="{78C97017-6FC3-485B-9764-EAC9E56C1D49}" type="datetimeFigureOut">
               <a:rPr lang="en-US" smtClean="0"/>
-              <a:t>11/10/18</a:t>
+              <a:t>11/12/18</a:t>
             </a:fld>
             <a:endParaRPr lang="en-US"/>
           </a:p>
@@ -1787,7 +1787,7 @@
           <a:p>
             <a:fld id="{78C97017-6FC3-485B-9764-EAC9E56C1D49}" type="datetimeFigureOut">
               <a:rPr lang="en-US" smtClean="0"/>
-              <a:t>11/10/18</a:t>
+              <a:t>11/12/18</a:t>
             </a:fld>
             <a:endParaRPr lang="en-US"/>
           </a:p>
@@ -2206,7 +2206,7 @@
           <a:p>
             <a:fld id="{78C97017-6FC3-485B-9764-EAC9E56C1D49}" type="datetimeFigureOut">
               <a:rPr lang="en-US" smtClean="0"/>
-              <a:t>11/10/18</a:t>
+              <a:t>11/12/18</a:t>
             </a:fld>
             <a:endParaRPr lang="en-US"/>
           </a:p>
@@ -2323,7 +2323,7 @@
           <a:p>
             <a:fld id="{78C97017-6FC3-485B-9764-EAC9E56C1D49}" type="datetimeFigureOut">
               <a:rPr lang="en-US" smtClean="0"/>
-              <a:t>11/10/18</a:t>
+              <a:t>11/12/18</a:t>
             </a:fld>
             <a:endParaRPr lang="en-US"/>
           </a:p>
@@ -2418,7 +2418,7 @@
           <a:p>
             <a:fld id="{78C97017-6FC3-485B-9764-EAC9E56C1D49}" type="datetimeFigureOut">
               <a:rPr lang="en-US" smtClean="0"/>
-              <a:t>11/10/18</a:t>
+              <a:t>11/12/18</a:t>
             </a:fld>
             <a:endParaRPr lang="en-US"/>
           </a:p>
@@ -2693,7 +2693,7 @@
           <a:p>
             <a:fld id="{78C97017-6FC3-485B-9764-EAC9E56C1D49}" type="datetimeFigureOut">
               <a:rPr lang="en-US" smtClean="0"/>
-              <a:t>11/10/18</a:t>
+              <a:t>11/12/18</a:t>
             </a:fld>
             <a:endParaRPr lang="en-US"/>
           </a:p>
@@ -2945,7 +2945,7 @@
           <a:p>
             <a:fld id="{78C97017-6FC3-485B-9764-EAC9E56C1D49}" type="datetimeFigureOut">
               <a:rPr lang="en-US" smtClean="0"/>
-              <a:t>11/10/18</a:t>
+              <a:t>11/12/18</a:t>
             </a:fld>
             <a:endParaRPr lang="en-US"/>
           </a:p>
@@ -3156,7 +3156,7 @@
           <a:p>
             <a:fld id="{78C97017-6FC3-485B-9764-EAC9E56C1D49}" type="datetimeFigureOut">
               <a:rPr lang="en-US" smtClean="0"/>
-              <a:t>11/10/18</a:t>
+              <a:t>11/12/18</a:t>
             </a:fld>
             <a:endParaRPr lang="en-US"/>
           </a:p>
@@ -4045,7 +4045,7 @@
           </a:prstGeom>
           <a:ln w="19050">
             <a:solidFill>
-              <a:srgbClr val="00B050"/>
+              <a:schemeClr val="accent1"/>
             </a:solidFill>
             <a:tailEnd type="arrow"/>
           </a:ln>
@@ -5791,8 +5791,8 @@
         </p:nvSpPr>
         <p:spPr>
           <a:xfrm>
-            <a:off x="19361336" y="15267648"/>
-            <a:ext cx="1880784" cy="459399"/>
+            <a:off x="19447669" y="15117084"/>
+            <a:ext cx="1880784" cy="609964"/>
           </a:xfrm>
           <a:prstGeom prst="rect">
             <a:avLst/>
@@ -5828,6 +5828,17 @@
             <a:pPr algn="ctr"/>
             <a:r>
               <a:rPr lang="en-US" sz="1600" dirty="0">
+                <a:solidFill>
+                  <a:schemeClr val="bg1"/>
+                </a:solidFill>
+              </a:rPr>
+              <a:t>&lt;&lt;class&gt;&gt;</a:t>
+            </a:r>
+          </a:p>
+          <a:p>
+            <a:pPr algn="ctr"/>
+            <a:r>
+              <a:rPr lang="en-US" sz="1600" dirty="0" err="1">
                 <a:solidFill>
                   <a:schemeClr val="bg1"/>
                 </a:solidFill>

</xml_diff>